<commit_message>
MTN #4 update pager icons size
</commit_message>
<xml_diff>
--- a/mdaviz/resources/icons.pptx
+++ b/mdaviz/resources/icons.pptx
@@ -259,7 +259,7 @@
           <a:p>
             <a:fld id="{972982F3-053C-7B4D-A5CF-EFE18F3D02A0}" type="datetimeFigureOut">
               <a:rPr lang="en-US" smtClean="0"/>
-              <a:t>8/14/23</a:t>
+              <a:t>9/1/23</a:t>
             </a:fld>
             <a:endParaRPr lang="en-US"/>
           </a:p>
@@ -457,7 +457,7 @@
           <a:p>
             <a:fld id="{972982F3-053C-7B4D-A5CF-EFE18F3D02A0}" type="datetimeFigureOut">
               <a:rPr lang="en-US" smtClean="0"/>
-              <a:t>8/14/23</a:t>
+              <a:t>9/1/23</a:t>
             </a:fld>
             <a:endParaRPr lang="en-US"/>
           </a:p>
@@ -665,7 +665,7 @@
           <a:p>
             <a:fld id="{972982F3-053C-7B4D-A5CF-EFE18F3D02A0}" type="datetimeFigureOut">
               <a:rPr lang="en-US" smtClean="0"/>
-              <a:t>8/14/23</a:t>
+              <a:t>9/1/23</a:t>
             </a:fld>
             <a:endParaRPr lang="en-US"/>
           </a:p>
@@ -863,7 +863,7 @@
           <a:p>
             <a:fld id="{972982F3-053C-7B4D-A5CF-EFE18F3D02A0}" type="datetimeFigureOut">
               <a:rPr lang="en-US" smtClean="0"/>
-              <a:t>8/14/23</a:t>
+              <a:t>9/1/23</a:t>
             </a:fld>
             <a:endParaRPr lang="en-US"/>
           </a:p>
@@ -1138,7 +1138,7 @@
           <a:p>
             <a:fld id="{972982F3-053C-7B4D-A5CF-EFE18F3D02A0}" type="datetimeFigureOut">
               <a:rPr lang="en-US" smtClean="0"/>
-              <a:t>8/14/23</a:t>
+              <a:t>9/1/23</a:t>
             </a:fld>
             <a:endParaRPr lang="en-US"/>
           </a:p>
@@ -1403,7 +1403,7 @@
           <a:p>
             <a:fld id="{972982F3-053C-7B4D-A5CF-EFE18F3D02A0}" type="datetimeFigureOut">
               <a:rPr lang="en-US" smtClean="0"/>
-              <a:t>8/14/23</a:t>
+              <a:t>9/1/23</a:t>
             </a:fld>
             <a:endParaRPr lang="en-US"/>
           </a:p>
@@ -1815,7 +1815,7 @@
           <a:p>
             <a:fld id="{972982F3-053C-7B4D-A5CF-EFE18F3D02A0}" type="datetimeFigureOut">
               <a:rPr lang="en-US" smtClean="0"/>
-              <a:t>8/14/23</a:t>
+              <a:t>9/1/23</a:t>
             </a:fld>
             <a:endParaRPr lang="en-US"/>
           </a:p>
@@ -1956,7 +1956,7 @@
           <a:p>
             <a:fld id="{972982F3-053C-7B4D-A5CF-EFE18F3D02A0}" type="datetimeFigureOut">
               <a:rPr lang="en-US" smtClean="0"/>
-              <a:t>8/14/23</a:t>
+              <a:t>9/1/23</a:t>
             </a:fld>
             <a:endParaRPr lang="en-US"/>
           </a:p>
@@ -2069,7 +2069,7 @@
           <a:p>
             <a:fld id="{972982F3-053C-7B4D-A5CF-EFE18F3D02A0}" type="datetimeFigureOut">
               <a:rPr lang="en-US" smtClean="0"/>
-              <a:t>8/14/23</a:t>
+              <a:t>9/1/23</a:t>
             </a:fld>
             <a:endParaRPr lang="en-US"/>
           </a:p>
@@ -2380,7 +2380,7 @@
           <a:p>
             <a:fld id="{972982F3-053C-7B4D-A5CF-EFE18F3D02A0}" type="datetimeFigureOut">
               <a:rPr lang="en-US" smtClean="0"/>
-              <a:t>8/14/23</a:t>
+              <a:t>9/1/23</a:t>
             </a:fld>
             <a:endParaRPr lang="en-US"/>
           </a:p>
@@ -2668,7 +2668,7 @@
           <a:p>
             <a:fld id="{972982F3-053C-7B4D-A5CF-EFE18F3D02A0}" type="datetimeFigureOut">
               <a:rPr lang="en-US" smtClean="0"/>
-              <a:t>8/14/23</a:t>
+              <a:t>9/1/23</a:t>
             </a:fld>
             <a:endParaRPr lang="en-US"/>
           </a:p>
@@ -2909,7 +2909,7 @@
           <a:p>
             <a:fld id="{972982F3-053C-7B4D-A5CF-EFE18F3D02A0}" type="datetimeFigureOut">
               <a:rPr lang="en-US" smtClean="0"/>
-              <a:t>8/14/23</a:t>
+              <a:t>9/1/23</a:t>
             </a:fld>
             <a:endParaRPr lang="en-US"/>
           </a:p>
@@ -3783,7 +3783,7 @@
         </p:blipFill>
         <p:spPr>
           <a:xfrm>
-            <a:off x="9448289" y="3562550"/>
+            <a:off x="6096000" y="4803961"/>
             <a:ext cx="2093057" cy="2093057"/>
           </a:xfrm>
           <a:prstGeom prst="rect">
@@ -3865,62 +3865,6 @@
       </p:pic>
       <p:sp>
         <p:nvSpPr>
-          <p:cNvPr id="32" name="Triangle 31">
-            <a:extLst>
-              <a:ext uri="{FF2B5EF4-FFF2-40B4-BE49-F238E27FC236}">
-                <a16:creationId xmlns:a16="http://schemas.microsoft.com/office/drawing/2014/main" id="{4B0E1157-6D5E-D84A-8DD3-C3176CC4205B}"/>
-              </a:ext>
-            </a:extLst>
-          </p:cNvPr>
-          <p:cNvSpPr>
-            <a:spLocks/>
-          </p:cNvSpPr>
-          <p:nvPr/>
-        </p:nvSpPr>
-        <p:spPr>
-          <a:xfrm rot="5400000">
-            <a:off x="6139544" y="4967897"/>
-            <a:ext cx="1124712" cy="914400"/>
-          </a:xfrm>
-          <a:prstGeom prst="triangle">
-            <a:avLst/>
-          </a:prstGeom>
-          <a:solidFill>
-            <a:schemeClr val="tx1"/>
-          </a:solidFill>
-          <a:ln w="57150">
-            <a:solidFill>
-              <a:schemeClr val="tx1"/>
-            </a:solidFill>
-          </a:ln>
-        </p:spPr>
-        <p:style>
-          <a:lnRef idx="2">
-            <a:schemeClr val="accent1">
-              <a:shade val="50000"/>
-            </a:schemeClr>
-          </a:lnRef>
-          <a:fillRef idx="1">
-            <a:schemeClr val="accent1"/>
-          </a:fillRef>
-          <a:effectRef idx="0">
-            <a:schemeClr val="accent1"/>
-          </a:effectRef>
-          <a:fontRef idx="minor">
-            <a:schemeClr val="lt1"/>
-          </a:fontRef>
-        </p:style>
-        <p:txBody>
-          <a:bodyPr rtlCol="0" anchor="ctr"/>
-          <a:lstStyle/>
-          <a:p>
-            <a:pPr algn="ctr"/>
-            <a:endParaRPr lang="en-US"/>
-          </a:p>
-        </p:txBody>
-      </p:sp>
-      <p:sp>
-        <p:nvSpPr>
           <p:cNvPr id="33" name="Triangle 32">
             <a:extLst>
               <a:ext uri="{FF2B5EF4-FFF2-40B4-BE49-F238E27FC236}">
@@ -3935,7 +3879,7 @@
         </p:nvSpPr>
         <p:spPr>
           <a:xfrm rot="16200000" flipH="1">
-            <a:off x="3555560" y="4967897"/>
+            <a:off x="2065419" y="5197163"/>
             <a:ext cx="1124712" cy="914400"/>
           </a:xfrm>
           <a:prstGeom prst="triangle">
@@ -4388,6 +4332,334 @@
             <a:lnRef idx="2">
               <a:schemeClr val="accent1">
                 <a:shade val="50000"/>
+              </a:schemeClr>
+            </a:lnRef>
+            <a:fillRef idx="1">
+              <a:schemeClr val="accent1"/>
+            </a:fillRef>
+            <a:effectRef idx="0">
+              <a:schemeClr val="accent1"/>
+            </a:effectRef>
+            <a:fontRef idx="minor">
+              <a:schemeClr val="lt1"/>
+            </a:fontRef>
+          </p:style>
+          <p:txBody>
+            <a:bodyPr rtlCol="0" anchor="ctr"/>
+            <a:lstStyle/>
+            <a:p>
+              <a:pPr algn="ctr"/>
+              <a:endParaRPr lang="en-US"/>
+            </a:p>
+          </p:txBody>
+        </p:sp>
+      </p:grpSp>
+      <p:grpSp>
+        <p:nvGrpSpPr>
+          <p:cNvPr id="10" name="Group 9">
+            <a:extLst>
+              <a:ext uri="{FF2B5EF4-FFF2-40B4-BE49-F238E27FC236}">
+                <a16:creationId xmlns:a16="http://schemas.microsoft.com/office/drawing/2014/main" id="{53960B88-011A-2180-70E9-A5A64E5FFC82}"/>
+              </a:ext>
+            </a:extLst>
+          </p:cNvPr>
+          <p:cNvGrpSpPr/>
+          <p:nvPr/>
+        </p:nvGrpSpPr>
+        <p:grpSpPr>
+          <a:xfrm>
+            <a:off x="4558284" y="4967841"/>
+            <a:ext cx="1674919" cy="1747914"/>
+            <a:chOff x="4558284" y="4967841"/>
+            <a:chExt cx="1674919" cy="1747914"/>
+          </a:xfrm>
+        </p:grpSpPr>
+        <p:pic>
+          <p:nvPicPr>
+            <p:cNvPr id="2" name="Graphic 1" descr="End with solid fill">
+              <a:extLst>
+                <a:ext uri="{FF2B5EF4-FFF2-40B4-BE49-F238E27FC236}">
+                  <a16:creationId xmlns:a16="http://schemas.microsoft.com/office/drawing/2014/main" id="{14593951-F353-AF23-936C-2BA0D1F1A9A1}"/>
+                </a:ext>
+              </a:extLst>
+            </p:cNvPr>
+            <p:cNvPicPr>
+              <a:picLocks noChangeAspect="1"/>
+            </p:cNvPicPr>
+            <p:nvPr/>
+          </p:nvPicPr>
+          <p:blipFill rotWithShape="1">
+            <a:blip r:embed="rId8">
+              <a:extLst>
+                <a:ext uri="{96DAC541-7B7A-43D3-8B79-37D633B846F1}">
+                  <asvg:svgBlip xmlns:asvg="http://schemas.microsoft.com/office/drawing/2016/SVG/main" r:embed="rId9"/>
+                </a:ext>
+              </a:extLst>
+            </a:blip>
+            <a:srcRect l="11095" t="8367" r="9383" b="11299"/>
+            <a:stretch/>
+          </p:blipFill>
+          <p:spPr>
+            <a:xfrm>
+              <a:off x="4568736" y="4967841"/>
+              <a:ext cx="1664467" cy="1681438"/>
+            </a:xfrm>
+            <a:prstGeom prst="rect">
+              <a:avLst/>
+            </a:prstGeom>
+          </p:spPr>
+        </p:pic>
+        <p:sp>
+          <p:nvSpPr>
+            <p:cNvPr id="4" name="Rectangle 3">
+              <a:extLst>
+                <a:ext uri="{FF2B5EF4-FFF2-40B4-BE49-F238E27FC236}">
+                  <a16:creationId xmlns:a16="http://schemas.microsoft.com/office/drawing/2014/main" id="{F57DDB9D-C511-BF1F-653E-7253FF80DDD8}"/>
+                </a:ext>
+              </a:extLst>
+            </p:cNvPr>
+            <p:cNvSpPr/>
+            <p:nvPr/>
+          </p:nvSpPr>
+          <p:spPr>
+            <a:xfrm>
+              <a:off x="5903843" y="5206995"/>
+              <a:ext cx="293530" cy="1508760"/>
+            </a:xfrm>
+            <a:prstGeom prst="rect">
+              <a:avLst/>
+            </a:prstGeom>
+            <a:solidFill>
+              <a:schemeClr val="bg1"/>
+            </a:solidFill>
+            <a:ln>
+              <a:solidFill>
+                <a:schemeClr val="bg1"/>
+              </a:solidFill>
+            </a:ln>
+          </p:spPr>
+          <p:style>
+            <a:lnRef idx="2">
+              <a:schemeClr val="accent1">
+                <a:shade val="15000"/>
+              </a:schemeClr>
+            </a:lnRef>
+            <a:fillRef idx="1">
+              <a:schemeClr val="accent1"/>
+            </a:fillRef>
+            <a:effectRef idx="0">
+              <a:schemeClr val="accent1"/>
+            </a:effectRef>
+            <a:fontRef idx="minor">
+              <a:schemeClr val="lt1"/>
+            </a:fontRef>
+          </p:style>
+          <p:txBody>
+            <a:bodyPr rtlCol="0" anchor="ctr"/>
+            <a:lstStyle/>
+            <a:p>
+              <a:pPr algn="ctr"/>
+              <a:endParaRPr lang="en-US"/>
+            </a:p>
+          </p:txBody>
+        </p:sp>
+        <p:sp>
+          <p:nvSpPr>
+            <p:cNvPr id="9" name="Rectangle 8">
+              <a:extLst>
+                <a:ext uri="{FF2B5EF4-FFF2-40B4-BE49-F238E27FC236}">
+                  <a16:creationId xmlns:a16="http://schemas.microsoft.com/office/drawing/2014/main" id="{4D7600F4-FAD8-7539-5183-7626FE8B0C68}"/>
+                </a:ext>
+              </a:extLst>
+            </p:cNvPr>
+            <p:cNvSpPr/>
+            <p:nvPr/>
+          </p:nvSpPr>
+          <p:spPr>
+            <a:xfrm>
+              <a:off x="4558284" y="5140519"/>
+              <a:ext cx="650227" cy="1508760"/>
+            </a:xfrm>
+            <a:prstGeom prst="rect">
+              <a:avLst/>
+            </a:prstGeom>
+            <a:solidFill>
+              <a:schemeClr val="bg1"/>
+            </a:solidFill>
+            <a:ln>
+              <a:solidFill>
+                <a:schemeClr val="bg1"/>
+              </a:solidFill>
+            </a:ln>
+          </p:spPr>
+          <p:style>
+            <a:lnRef idx="2">
+              <a:schemeClr val="accent1">
+                <a:shade val="15000"/>
+              </a:schemeClr>
+            </a:lnRef>
+            <a:fillRef idx="1">
+              <a:schemeClr val="accent1"/>
+            </a:fillRef>
+            <a:effectRef idx="0">
+              <a:schemeClr val="accent1"/>
+            </a:effectRef>
+            <a:fontRef idx="minor">
+              <a:schemeClr val="lt1"/>
+            </a:fontRef>
+          </p:style>
+          <p:txBody>
+            <a:bodyPr rtlCol="0" anchor="ctr"/>
+            <a:lstStyle/>
+            <a:p>
+              <a:pPr algn="ctr"/>
+              <a:endParaRPr lang="en-US"/>
+            </a:p>
+          </p:txBody>
+        </p:sp>
+      </p:grpSp>
+      <p:grpSp>
+        <p:nvGrpSpPr>
+          <p:cNvPr id="12" name="Group 11">
+            <a:extLst>
+              <a:ext uri="{FF2B5EF4-FFF2-40B4-BE49-F238E27FC236}">
+                <a16:creationId xmlns:a16="http://schemas.microsoft.com/office/drawing/2014/main" id="{330EA3F7-2FA0-720D-D077-1F35D2C8D92F}"/>
+              </a:ext>
+            </a:extLst>
+          </p:cNvPr>
+          <p:cNvGrpSpPr/>
+          <p:nvPr/>
+        </p:nvGrpSpPr>
+        <p:grpSpPr>
+          <a:xfrm flipH="1">
+            <a:off x="9277338" y="3735121"/>
+            <a:ext cx="1674919" cy="1747914"/>
+            <a:chOff x="4558284" y="4967841"/>
+            <a:chExt cx="1674919" cy="1747914"/>
+          </a:xfrm>
+        </p:grpSpPr>
+        <p:pic>
+          <p:nvPicPr>
+            <p:cNvPr id="13" name="Graphic 12" descr="End with solid fill">
+              <a:extLst>
+                <a:ext uri="{FF2B5EF4-FFF2-40B4-BE49-F238E27FC236}">
+                  <a16:creationId xmlns:a16="http://schemas.microsoft.com/office/drawing/2014/main" id="{FD197866-9BD1-FA57-82D0-839A216E4137}"/>
+                </a:ext>
+              </a:extLst>
+            </p:cNvPr>
+            <p:cNvPicPr>
+              <a:picLocks noChangeAspect="1"/>
+            </p:cNvPicPr>
+            <p:nvPr/>
+          </p:nvPicPr>
+          <p:blipFill rotWithShape="1">
+            <a:blip r:embed="rId8">
+              <a:extLst>
+                <a:ext uri="{96DAC541-7B7A-43D3-8B79-37D633B846F1}">
+                  <asvg:svgBlip xmlns:asvg="http://schemas.microsoft.com/office/drawing/2016/SVG/main" r:embed="rId9"/>
+                </a:ext>
+              </a:extLst>
+            </a:blip>
+            <a:srcRect l="11095" t="8367" r="9383" b="11299"/>
+            <a:stretch/>
+          </p:blipFill>
+          <p:spPr>
+            <a:xfrm>
+              <a:off x="4568736" y="4967841"/>
+              <a:ext cx="1664467" cy="1681438"/>
+            </a:xfrm>
+            <a:prstGeom prst="rect">
+              <a:avLst/>
+            </a:prstGeom>
+          </p:spPr>
+        </p:pic>
+        <p:sp>
+          <p:nvSpPr>
+            <p:cNvPr id="14" name="Rectangle 13">
+              <a:extLst>
+                <a:ext uri="{FF2B5EF4-FFF2-40B4-BE49-F238E27FC236}">
+                  <a16:creationId xmlns:a16="http://schemas.microsoft.com/office/drawing/2014/main" id="{E040E1EC-C335-7A0E-AF90-D40006FE72E1}"/>
+                </a:ext>
+              </a:extLst>
+            </p:cNvPr>
+            <p:cNvSpPr/>
+            <p:nvPr/>
+          </p:nvSpPr>
+          <p:spPr>
+            <a:xfrm>
+              <a:off x="5903843" y="5206995"/>
+              <a:ext cx="293530" cy="1508760"/>
+            </a:xfrm>
+            <a:prstGeom prst="rect">
+              <a:avLst/>
+            </a:prstGeom>
+            <a:solidFill>
+              <a:schemeClr val="bg1"/>
+            </a:solidFill>
+            <a:ln>
+              <a:solidFill>
+                <a:schemeClr val="bg1"/>
+              </a:solidFill>
+            </a:ln>
+          </p:spPr>
+          <p:style>
+            <a:lnRef idx="2">
+              <a:schemeClr val="accent1">
+                <a:shade val="15000"/>
+              </a:schemeClr>
+            </a:lnRef>
+            <a:fillRef idx="1">
+              <a:schemeClr val="accent1"/>
+            </a:fillRef>
+            <a:effectRef idx="0">
+              <a:schemeClr val="accent1"/>
+            </a:effectRef>
+            <a:fontRef idx="minor">
+              <a:schemeClr val="lt1"/>
+            </a:fontRef>
+          </p:style>
+          <p:txBody>
+            <a:bodyPr rtlCol="0" anchor="ctr"/>
+            <a:lstStyle/>
+            <a:p>
+              <a:pPr algn="ctr"/>
+              <a:endParaRPr lang="en-US"/>
+            </a:p>
+          </p:txBody>
+        </p:sp>
+        <p:sp>
+          <p:nvSpPr>
+            <p:cNvPr id="18" name="Rectangle 17">
+              <a:extLst>
+                <a:ext uri="{FF2B5EF4-FFF2-40B4-BE49-F238E27FC236}">
+                  <a16:creationId xmlns:a16="http://schemas.microsoft.com/office/drawing/2014/main" id="{FDD5940B-7F0E-7F8D-7EB5-E2E8866A6C0B}"/>
+                </a:ext>
+              </a:extLst>
+            </p:cNvPr>
+            <p:cNvSpPr/>
+            <p:nvPr/>
+          </p:nvSpPr>
+          <p:spPr>
+            <a:xfrm>
+              <a:off x="4558284" y="5140519"/>
+              <a:ext cx="650227" cy="1508760"/>
+            </a:xfrm>
+            <a:prstGeom prst="rect">
+              <a:avLst/>
+            </a:prstGeom>
+            <a:solidFill>
+              <a:schemeClr val="bg1"/>
+            </a:solidFill>
+            <a:ln>
+              <a:solidFill>
+                <a:schemeClr val="bg1"/>
+              </a:solidFill>
+            </a:ln>
+          </p:spPr>
+          <p:style>
+            <a:lnRef idx="2">
+              <a:schemeClr val="accent1">
+                <a:shade val="15000"/>
               </a:schemeClr>
             </a:lnRef>
             <a:fillRef idx="1">

</xml_diff>

<commit_message>
DEV #13 change ui text and update icons
</commit_message>
<xml_diff>
--- a/mdaviz/resources/icons.pptx
+++ b/mdaviz/resources/icons.pptx
@@ -3755,42 +3755,117 @@
           </a:prstGeom>
         </p:spPr>
       </p:pic>
-      <p:pic>
-        <p:nvPicPr>
-          <p:cNvPr id="26" name="Graphic 25" descr="End with solid fill">
-            <a:extLst>
-              <a:ext uri="{FF2B5EF4-FFF2-40B4-BE49-F238E27FC236}">
-                <a16:creationId xmlns:a16="http://schemas.microsoft.com/office/drawing/2014/main" id="{41A40218-87B9-024B-932A-BC97830C8D7E}"/>
-              </a:ext>
-            </a:extLst>
-          </p:cNvPr>
-          <p:cNvPicPr>
-            <a:picLocks noChangeAspect="1"/>
-          </p:cNvPicPr>
+      <p:grpSp>
+        <p:nvGrpSpPr>
+          <p:cNvPr id="27" name="Group 26">
+            <a:extLst>
+              <a:ext uri="{FF2B5EF4-FFF2-40B4-BE49-F238E27FC236}">
+                <a16:creationId xmlns:a16="http://schemas.microsoft.com/office/drawing/2014/main" id="{62E16E61-2C0E-CA7F-908D-7F0B34EA2B44}"/>
+              </a:ext>
+            </a:extLst>
+          </p:cNvPr>
+          <p:cNvGrpSpPr/>
           <p:nvPr/>
-        </p:nvPicPr>
-        <p:blipFill>
-          <a:blip r:embed="rId8">
-            <a:extLst>
-              <a:ext uri="{96DAC541-7B7A-43D3-8B79-37D633B846F1}">
-                <asvg:svgBlip xmlns:asvg="http://schemas.microsoft.com/office/drawing/2016/SVG/main" r:embed="rId9"/>
-              </a:ext>
-            </a:extLst>
-          </a:blip>
-          <a:stretch>
-            <a:fillRect/>
-          </a:stretch>
-        </p:blipFill>
-        <p:spPr>
+        </p:nvGrpSpPr>
+        <p:grpSpPr>
           <a:xfrm>
             <a:off x="6096000" y="4803961"/>
             <a:ext cx="2093057" cy="2093057"/>
+            <a:chOff x="6096000" y="4803961"/>
+            <a:chExt cx="2093057" cy="2093057"/>
           </a:xfrm>
-          <a:prstGeom prst="rect">
-            <a:avLst/>
-          </a:prstGeom>
-        </p:spPr>
-      </p:pic>
+        </p:grpSpPr>
+        <p:sp>
+          <p:nvSpPr>
+            <p:cNvPr id="25" name="Rectangle 24">
+              <a:extLst>
+                <a:ext uri="{FF2B5EF4-FFF2-40B4-BE49-F238E27FC236}">
+                  <a16:creationId xmlns:a16="http://schemas.microsoft.com/office/drawing/2014/main" id="{10766670-ECBA-C72F-4418-6157516A0866}"/>
+                </a:ext>
+              </a:extLst>
+            </p:cNvPr>
+            <p:cNvSpPr/>
+            <p:nvPr/>
+          </p:nvSpPr>
+          <p:spPr>
+            <a:xfrm>
+              <a:off x="6326272" y="5152771"/>
+              <a:ext cx="1635254" cy="1562983"/>
+            </a:xfrm>
+            <a:prstGeom prst="rect">
+              <a:avLst/>
+            </a:prstGeom>
+            <a:solidFill>
+              <a:schemeClr val="bg1"/>
+            </a:solidFill>
+            <a:ln>
+              <a:solidFill>
+                <a:schemeClr val="bg1"/>
+              </a:solidFill>
+            </a:ln>
+          </p:spPr>
+          <p:style>
+            <a:lnRef idx="2">
+              <a:schemeClr val="accent1">
+                <a:shade val="15000"/>
+              </a:schemeClr>
+            </a:lnRef>
+            <a:fillRef idx="1">
+              <a:schemeClr val="accent1"/>
+            </a:fillRef>
+            <a:effectRef idx="0">
+              <a:schemeClr val="accent1"/>
+            </a:effectRef>
+            <a:fontRef idx="minor">
+              <a:schemeClr val="lt1"/>
+            </a:fontRef>
+          </p:style>
+          <p:txBody>
+            <a:bodyPr rtlCol="0" anchor="ctr"/>
+            <a:lstStyle/>
+            <a:p>
+              <a:pPr algn="ctr"/>
+              <a:endParaRPr lang="en-US"/>
+            </a:p>
+          </p:txBody>
+        </p:sp>
+        <p:pic>
+          <p:nvPicPr>
+            <p:cNvPr id="26" name="Graphic 25" descr="End with solid fill">
+              <a:extLst>
+                <a:ext uri="{FF2B5EF4-FFF2-40B4-BE49-F238E27FC236}">
+                  <a16:creationId xmlns:a16="http://schemas.microsoft.com/office/drawing/2014/main" id="{41A40218-87B9-024B-932A-BC97830C8D7E}"/>
+                </a:ext>
+              </a:extLst>
+            </p:cNvPr>
+            <p:cNvPicPr>
+              <a:picLocks noChangeAspect="1"/>
+            </p:cNvPicPr>
+            <p:nvPr/>
+          </p:nvPicPr>
+          <p:blipFill>
+            <a:blip r:embed="rId8">
+              <a:extLst>
+                <a:ext uri="{96DAC541-7B7A-43D3-8B79-37D633B846F1}">
+                  <asvg:svgBlip xmlns:asvg="http://schemas.microsoft.com/office/drawing/2016/SVG/main" r:embed="rId9"/>
+                </a:ext>
+              </a:extLst>
+            </a:blip>
+            <a:stretch>
+              <a:fillRect/>
+            </a:stretch>
+          </p:blipFill>
+          <p:spPr>
+            <a:xfrm>
+              <a:off x="6096000" y="4803961"/>
+              <a:ext cx="2093057" cy="2093057"/>
+            </a:xfrm>
+            <a:prstGeom prst="rect">
+              <a:avLst/>
+            </a:prstGeom>
+          </p:spPr>
+        </p:pic>
+      </p:grpSp>
       <p:pic>
         <p:nvPicPr>
           <p:cNvPr id="28" name="Graphic 27" descr="Refresh with solid fill">
@@ -3827,98 +3902,6 @@
           </a:prstGeom>
         </p:spPr>
       </p:pic>
-      <p:pic>
-        <p:nvPicPr>
-          <p:cNvPr id="31" name="Graphic 30" descr="End with solid fill">
-            <a:extLst>
-              <a:ext uri="{FF2B5EF4-FFF2-40B4-BE49-F238E27FC236}">
-                <a16:creationId xmlns:a16="http://schemas.microsoft.com/office/drawing/2014/main" id="{57D772FE-290C-F74C-8FC7-EC0180145B09}"/>
-              </a:ext>
-            </a:extLst>
-          </p:cNvPr>
-          <p:cNvPicPr>
-            <a:picLocks noChangeAspect="1"/>
-          </p:cNvPicPr>
-          <p:nvPr/>
-        </p:nvPicPr>
-        <p:blipFill>
-          <a:blip r:embed="rId8">
-            <a:extLst>
-              <a:ext uri="{96DAC541-7B7A-43D3-8B79-37D633B846F1}">
-                <asvg:svgBlip xmlns:asvg="http://schemas.microsoft.com/office/drawing/2016/SVG/main" r:embed="rId9"/>
-              </a:ext>
-            </a:extLst>
-          </a:blip>
-          <a:stretch>
-            <a:fillRect/>
-          </a:stretch>
-        </p:blipFill>
-        <p:spPr>
-          <a:xfrm flipH="1">
-            <a:off x="6667500" y="2207426"/>
-            <a:ext cx="2093057" cy="2093057"/>
-          </a:xfrm>
-          <a:prstGeom prst="rect">
-            <a:avLst/>
-          </a:prstGeom>
-        </p:spPr>
-      </p:pic>
-      <p:sp>
-        <p:nvSpPr>
-          <p:cNvPr id="33" name="Triangle 32">
-            <a:extLst>
-              <a:ext uri="{FF2B5EF4-FFF2-40B4-BE49-F238E27FC236}">
-                <a16:creationId xmlns:a16="http://schemas.microsoft.com/office/drawing/2014/main" id="{843227B8-CD8B-3442-809D-ACB1F200C968}"/>
-              </a:ext>
-            </a:extLst>
-          </p:cNvPr>
-          <p:cNvSpPr>
-            <a:spLocks/>
-          </p:cNvSpPr>
-          <p:nvPr/>
-        </p:nvSpPr>
-        <p:spPr>
-          <a:xfrm rot="16200000" flipH="1">
-            <a:off x="2065419" y="5197163"/>
-            <a:ext cx="1124712" cy="914400"/>
-          </a:xfrm>
-          <a:prstGeom prst="triangle">
-            <a:avLst/>
-          </a:prstGeom>
-          <a:solidFill>
-            <a:schemeClr val="tx1"/>
-          </a:solidFill>
-          <a:ln w="57150">
-            <a:solidFill>
-              <a:schemeClr val="tx1"/>
-            </a:solidFill>
-          </a:ln>
-        </p:spPr>
-        <p:style>
-          <a:lnRef idx="2">
-            <a:schemeClr val="accent1">
-              <a:shade val="50000"/>
-            </a:schemeClr>
-          </a:lnRef>
-          <a:fillRef idx="1">
-            <a:schemeClr val="accent1"/>
-          </a:fillRef>
-          <a:effectRef idx="0">
-            <a:schemeClr val="accent1"/>
-          </a:effectRef>
-          <a:fontRef idx="minor">
-            <a:schemeClr val="lt1"/>
-          </a:fontRef>
-        </p:style>
-        <p:txBody>
-          <a:bodyPr rtlCol="0" anchor="ctr"/>
-          <a:lstStyle/>
-          <a:p>
-            <a:pPr algn="ctr"/>
-            <a:endParaRPr lang="en-US"/>
-          </a:p>
-        </p:txBody>
-      </p:sp>
       <p:pic>
         <p:nvPicPr>
           <p:cNvPr id="30" name="Graphic 29" descr="Refresh outline">
@@ -4356,10 +4339,10 @@
       </p:grpSp>
       <p:grpSp>
         <p:nvGrpSpPr>
-          <p:cNvPr id="10" name="Group 9">
-            <a:extLst>
-              <a:ext uri="{FF2B5EF4-FFF2-40B4-BE49-F238E27FC236}">
-                <a16:creationId xmlns:a16="http://schemas.microsoft.com/office/drawing/2014/main" id="{53960B88-011A-2180-70E9-A5A64E5FFC82}"/>
+          <p:cNvPr id="29" name="Group 28">
+            <a:extLst>
+              <a:ext uri="{FF2B5EF4-FFF2-40B4-BE49-F238E27FC236}">
+                <a16:creationId xmlns:a16="http://schemas.microsoft.com/office/drawing/2014/main" id="{5F2DA1F2-6EA9-166B-6A27-BB6F201060BC}"/>
               </a:ext>
             </a:extLst>
           </p:cNvPr>
@@ -4374,6 +4357,60 @@
             <a:chExt cx="1674919" cy="1747914"/>
           </a:xfrm>
         </p:grpSpPr>
+        <p:sp>
+          <p:nvSpPr>
+            <p:cNvPr id="23" name="Rectangle 22">
+              <a:extLst>
+                <a:ext uri="{FF2B5EF4-FFF2-40B4-BE49-F238E27FC236}">
+                  <a16:creationId xmlns:a16="http://schemas.microsoft.com/office/drawing/2014/main" id="{AC1C844C-7544-A152-F9FE-2EA0363D203C}"/>
+                </a:ext>
+              </a:extLst>
+            </p:cNvPr>
+            <p:cNvSpPr/>
+            <p:nvPr/>
+          </p:nvSpPr>
+          <p:spPr>
+            <a:xfrm>
+              <a:off x="4562119" y="5152771"/>
+              <a:ext cx="1635254" cy="1562983"/>
+            </a:xfrm>
+            <a:prstGeom prst="rect">
+              <a:avLst/>
+            </a:prstGeom>
+            <a:solidFill>
+              <a:schemeClr val="bg1"/>
+            </a:solidFill>
+            <a:ln>
+              <a:solidFill>
+                <a:schemeClr val="bg1"/>
+              </a:solidFill>
+            </a:ln>
+          </p:spPr>
+          <p:style>
+            <a:lnRef idx="2">
+              <a:schemeClr val="accent1">
+                <a:shade val="15000"/>
+              </a:schemeClr>
+            </a:lnRef>
+            <a:fillRef idx="1">
+              <a:schemeClr val="accent1"/>
+            </a:fillRef>
+            <a:effectRef idx="0">
+              <a:schemeClr val="accent1"/>
+            </a:effectRef>
+            <a:fontRef idx="minor">
+              <a:schemeClr val="lt1"/>
+            </a:fontRef>
+          </p:style>
+          <p:txBody>
+            <a:bodyPr rtlCol="0" anchor="ctr"/>
+            <a:lstStyle/>
+            <a:p>
+              <a:pPr algn="ctr"/>
+              <a:endParaRPr lang="en-US"/>
+            </a:p>
+          </p:txBody>
+        </p:sp>
         <p:pic>
           <p:nvPicPr>
             <p:cNvPr id="2" name="Graphic 1" descr="End with solid fill">
@@ -4477,7 +4514,7 @@
           </p:nvSpPr>
           <p:spPr>
             <a:xfrm>
-              <a:off x="4558284" y="5140519"/>
+              <a:off x="4558284" y="5160397"/>
               <a:ext cx="650227" cy="1508760"/>
             </a:xfrm>
             <a:prstGeom prst="rect">
@@ -4520,10 +4557,10 @@
       </p:grpSp>
       <p:grpSp>
         <p:nvGrpSpPr>
-          <p:cNvPr id="12" name="Group 11">
-            <a:extLst>
-              <a:ext uri="{FF2B5EF4-FFF2-40B4-BE49-F238E27FC236}">
-                <a16:creationId xmlns:a16="http://schemas.microsoft.com/office/drawing/2014/main" id="{330EA3F7-2FA0-720D-D077-1F35D2C8D92F}"/>
+          <p:cNvPr id="34" name="Group 33">
+            <a:extLst>
+              <a:ext uri="{FF2B5EF4-FFF2-40B4-BE49-F238E27FC236}">
+                <a16:creationId xmlns:a16="http://schemas.microsoft.com/office/drawing/2014/main" id="{653B51F6-33CC-6DCB-CA8F-D4A9FD2F43BE}"/>
               </a:ext>
             </a:extLst>
           </p:cNvPr>
@@ -4532,18 +4569,72 @@
         </p:nvGrpSpPr>
         <p:grpSpPr>
           <a:xfrm flipH="1">
-            <a:off x="9277338" y="3735121"/>
+            <a:off x="9895867" y="3886200"/>
             <a:ext cx="1674919" cy="1747914"/>
             <a:chOff x="4558284" y="4967841"/>
             <a:chExt cx="1674919" cy="1747914"/>
           </a:xfrm>
         </p:grpSpPr>
+        <p:sp>
+          <p:nvSpPr>
+            <p:cNvPr id="36" name="Rectangle 35">
+              <a:extLst>
+                <a:ext uri="{FF2B5EF4-FFF2-40B4-BE49-F238E27FC236}">
+                  <a16:creationId xmlns:a16="http://schemas.microsoft.com/office/drawing/2014/main" id="{A10A8870-3B3F-4C50-E238-5250B9094D43}"/>
+                </a:ext>
+              </a:extLst>
+            </p:cNvPr>
+            <p:cNvSpPr/>
+            <p:nvPr/>
+          </p:nvSpPr>
+          <p:spPr>
+            <a:xfrm>
+              <a:off x="4562119" y="5152771"/>
+              <a:ext cx="1635254" cy="1562983"/>
+            </a:xfrm>
+            <a:prstGeom prst="rect">
+              <a:avLst/>
+            </a:prstGeom>
+            <a:solidFill>
+              <a:schemeClr val="bg1"/>
+            </a:solidFill>
+            <a:ln>
+              <a:solidFill>
+                <a:schemeClr val="bg1"/>
+              </a:solidFill>
+            </a:ln>
+          </p:spPr>
+          <p:style>
+            <a:lnRef idx="2">
+              <a:schemeClr val="accent1">
+                <a:shade val="15000"/>
+              </a:schemeClr>
+            </a:lnRef>
+            <a:fillRef idx="1">
+              <a:schemeClr val="accent1"/>
+            </a:fillRef>
+            <a:effectRef idx="0">
+              <a:schemeClr val="accent1"/>
+            </a:effectRef>
+            <a:fontRef idx="minor">
+              <a:schemeClr val="lt1"/>
+            </a:fontRef>
+          </p:style>
+          <p:txBody>
+            <a:bodyPr rtlCol="0" anchor="ctr"/>
+            <a:lstStyle/>
+            <a:p>
+              <a:pPr algn="ctr"/>
+              <a:endParaRPr lang="en-US"/>
+            </a:p>
+          </p:txBody>
+        </p:sp>
         <p:pic>
           <p:nvPicPr>
-            <p:cNvPr id="13" name="Graphic 12" descr="End with solid fill">
+            <p:cNvPr id="38" name="Graphic 37" descr="End with solid fill">
               <a:extLst>
                 <a:ext uri="{FF2B5EF4-FFF2-40B4-BE49-F238E27FC236}">
-                  <a16:creationId xmlns:a16="http://schemas.microsoft.com/office/drawing/2014/main" id="{FD197866-9BD1-FA57-82D0-839A216E4137}"/>
+                  <a16:creationId xmlns:a16="http://schemas.microsoft.com/office/drawing/2014/main" id="{616F31F5-8879-90ED-7900-C87DBC6C0DBA}"/>
                 </a:ext>
               </a:extLst>
             </p:cNvPr>
@@ -4575,10 +4666,10 @@
         </p:pic>
         <p:sp>
           <p:nvSpPr>
-            <p:cNvPr id="14" name="Rectangle 13">
+            <p:cNvPr id="40" name="Rectangle 39">
               <a:extLst>
                 <a:ext uri="{FF2B5EF4-FFF2-40B4-BE49-F238E27FC236}">
-                  <a16:creationId xmlns:a16="http://schemas.microsoft.com/office/drawing/2014/main" id="{E040E1EC-C335-7A0E-AF90-D40006FE72E1}"/>
+                  <a16:creationId xmlns:a16="http://schemas.microsoft.com/office/drawing/2014/main" id="{A19AB278-C78E-B775-13CF-4DD4D65F11B6}"/>
                 </a:ext>
               </a:extLst>
             </p:cNvPr>
@@ -4629,10 +4720,10 @@
         </p:sp>
         <p:sp>
           <p:nvSpPr>
-            <p:cNvPr id="18" name="Rectangle 17">
+            <p:cNvPr id="42" name="Rectangle 41">
               <a:extLst>
                 <a:ext uri="{FF2B5EF4-FFF2-40B4-BE49-F238E27FC236}">
-                  <a16:creationId xmlns:a16="http://schemas.microsoft.com/office/drawing/2014/main" id="{FDD5940B-7F0E-7F8D-7EB5-E2E8866A6C0B}"/>
+                  <a16:creationId xmlns:a16="http://schemas.microsoft.com/office/drawing/2014/main" id="{4C3F9ADB-A262-72A7-DAF6-38506487A8CD}"/>
                 </a:ext>
               </a:extLst>
             </p:cNvPr>
@@ -4641,7 +4732,7 @@
           </p:nvSpPr>
           <p:spPr>
             <a:xfrm>
-              <a:off x="4558284" y="5140519"/>
+              <a:off x="4558284" y="5160397"/>
               <a:ext cx="650227" cy="1508760"/>
             </a:xfrm>
             <a:prstGeom prst="rect">
@@ -4681,6 +4772,117 @@
             </a:p>
           </p:txBody>
         </p:sp>
+      </p:grpSp>
+      <p:grpSp>
+        <p:nvGrpSpPr>
+          <p:cNvPr id="44" name="Group 43">
+            <a:extLst>
+              <a:ext uri="{FF2B5EF4-FFF2-40B4-BE49-F238E27FC236}">
+                <a16:creationId xmlns:a16="http://schemas.microsoft.com/office/drawing/2014/main" id="{DB3918EC-6032-4B5C-175F-64D0060BBEF6}"/>
+              </a:ext>
+            </a:extLst>
+          </p:cNvPr>
+          <p:cNvGrpSpPr/>
+          <p:nvPr/>
+        </p:nvGrpSpPr>
+        <p:grpSpPr>
+          <a:xfrm flipH="1">
+            <a:off x="7692960" y="1931584"/>
+            <a:ext cx="2093057" cy="2093057"/>
+            <a:chOff x="6096000" y="4803961"/>
+            <a:chExt cx="2093057" cy="2093057"/>
+          </a:xfrm>
+        </p:grpSpPr>
+        <p:sp>
+          <p:nvSpPr>
+            <p:cNvPr id="46" name="Rectangle 45">
+              <a:extLst>
+                <a:ext uri="{FF2B5EF4-FFF2-40B4-BE49-F238E27FC236}">
+                  <a16:creationId xmlns:a16="http://schemas.microsoft.com/office/drawing/2014/main" id="{3E72EB24-A1D1-1BBE-2779-CA0D58EBEF75}"/>
+                </a:ext>
+              </a:extLst>
+            </p:cNvPr>
+            <p:cNvSpPr/>
+            <p:nvPr/>
+          </p:nvSpPr>
+          <p:spPr>
+            <a:xfrm>
+              <a:off x="6326272" y="5152771"/>
+              <a:ext cx="1635254" cy="1562983"/>
+            </a:xfrm>
+            <a:prstGeom prst="rect">
+              <a:avLst/>
+            </a:prstGeom>
+            <a:solidFill>
+              <a:schemeClr val="bg1"/>
+            </a:solidFill>
+            <a:ln>
+              <a:solidFill>
+                <a:schemeClr val="bg1"/>
+              </a:solidFill>
+            </a:ln>
+          </p:spPr>
+          <p:style>
+            <a:lnRef idx="2">
+              <a:schemeClr val="accent1">
+                <a:shade val="15000"/>
+              </a:schemeClr>
+            </a:lnRef>
+            <a:fillRef idx="1">
+              <a:schemeClr val="accent1"/>
+            </a:fillRef>
+            <a:effectRef idx="0">
+              <a:schemeClr val="accent1"/>
+            </a:effectRef>
+            <a:fontRef idx="minor">
+              <a:schemeClr val="lt1"/>
+            </a:fontRef>
+          </p:style>
+          <p:txBody>
+            <a:bodyPr rtlCol="0" anchor="ctr"/>
+            <a:lstStyle/>
+            <a:p>
+              <a:pPr algn="ctr"/>
+              <a:endParaRPr lang="en-US"/>
+            </a:p>
+          </p:txBody>
+        </p:sp>
+        <p:pic>
+          <p:nvPicPr>
+            <p:cNvPr id="48" name="Graphic 47" descr="End with solid fill">
+              <a:extLst>
+                <a:ext uri="{FF2B5EF4-FFF2-40B4-BE49-F238E27FC236}">
+                  <a16:creationId xmlns:a16="http://schemas.microsoft.com/office/drawing/2014/main" id="{15CA7B5F-2357-79C1-2AEE-B084F072F83A}"/>
+                </a:ext>
+              </a:extLst>
+            </p:cNvPr>
+            <p:cNvPicPr>
+              <a:picLocks noChangeAspect="1"/>
+            </p:cNvPicPr>
+            <p:nvPr/>
+          </p:nvPicPr>
+          <p:blipFill>
+            <a:blip r:embed="rId8">
+              <a:extLst>
+                <a:ext uri="{96DAC541-7B7A-43D3-8B79-37D633B846F1}">
+                  <asvg:svgBlip xmlns:asvg="http://schemas.microsoft.com/office/drawing/2016/SVG/main" r:embed="rId9"/>
+                </a:ext>
+              </a:extLst>
+            </a:blip>
+            <a:stretch>
+              <a:fillRect/>
+            </a:stretch>
+          </p:blipFill>
+          <p:spPr>
+            <a:xfrm>
+              <a:off x="6096000" y="4803961"/>
+              <a:ext cx="2093057" cy="2093057"/>
+            </a:xfrm>
+            <a:prstGeom prst="rect">
+              <a:avLst/>
+            </a:prstGeom>
+          </p:spPr>
+        </p:pic>
       </p:grpSp>
     </p:spTree>
     <p:extLst>

</xml_diff>

<commit_message>
DEV #13 update icons
</commit_message>
<xml_diff>
--- a/mdaviz/resources/icons.pptx
+++ b/mdaviz/resources/icons.pptx
@@ -3769,7 +3769,7 @@
         </p:nvGrpSpPr>
         <p:grpSpPr>
           <a:xfrm>
-            <a:off x="6096000" y="4803961"/>
+            <a:off x="-1386890" y="1558417"/>
             <a:ext cx="2093057" cy="2093057"/>
             <a:chOff x="6096000" y="4803961"/>
             <a:chExt cx="2093057" cy="2093057"/>
@@ -4351,7 +4351,7 @@
         </p:nvGrpSpPr>
         <p:grpSpPr>
           <a:xfrm>
-            <a:off x="4558284" y="4967841"/>
+            <a:off x="-1267245" y="3386083"/>
             <a:ext cx="1674919" cy="1747914"/>
             <a:chOff x="4558284" y="4967841"/>
             <a:chExt cx="1674919" cy="1747914"/>
@@ -4569,7 +4569,7 @@
         </p:nvGrpSpPr>
         <p:grpSpPr>
           <a:xfrm flipH="1">
-            <a:off x="9895867" y="3886200"/>
+            <a:off x="-773140" y="5179718"/>
             <a:ext cx="1674919" cy="1747914"/>
             <a:chOff x="4558284" y="4967841"/>
             <a:chExt cx="1674919" cy="1747914"/>
@@ -4787,7 +4787,7 @@
         </p:nvGrpSpPr>
         <p:grpSpPr>
           <a:xfrm flipH="1">
-            <a:off x="7692960" y="1931584"/>
+            <a:off x="-1442032" y="-62668"/>
             <a:ext cx="2093057" cy="2093057"/>
             <a:chOff x="6096000" y="4803961"/>
             <a:chExt cx="2093057" cy="2093057"/>
@@ -4884,6 +4884,148 @@
           </p:spPr>
         </p:pic>
       </p:grpSp>
+      <p:pic>
+        <p:nvPicPr>
+          <p:cNvPr id="58" name="Graphic 57" descr="End with solid fill">
+            <a:extLst>
+              <a:ext uri="{FF2B5EF4-FFF2-40B4-BE49-F238E27FC236}">
+                <a16:creationId xmlns:a16="http://schemas.microsoft.com/office/drawing/2014/main" id="{C0181D33-31E1-BF54-7F01-B58C12BB9FFC}"/>
+              </a:ext>
+            </a:extLst>
+          </p:cNvPr>
+          <p:cNvPicPr>
+            <a:picLocks noChangeAspect="1"/>
+          </p:cNvPicPr>
+          <p:nvPr/>
+        </p:nvPicPr>
+        <p:blipFill rotWithShape="1">
+          <a:blip r:embed="rId8">
+            <a:extLst>
+              <a:ext uri="{96DAC541-7B7A-43D3-8B79-37D633B846F1}">
+                <asvg:svgBlip xmlns:asvg="http://schemas.microsoft.com/office/drawing/2016/SVG/main" r:embed="rId9"/>
+              </a:ext>
+            </a:extLst>
+          </a:blip>
+          <a:srcRect l="42413" t="-180" r="24822" b="180"/>
+          <a:stretch/>
+        </p:blipFill>
+        <p:spPr>
+          <a:xfrm>
+            <a:off x="5760720" y="4773168"/>
+            <a:ext cx="685800" cy="2093057"/>
+          </a:xfrm>
+          <a:prstGeom prst="rect">
+            <a:avLst/>
+          </a:prstGeom>
+        </p:spPr>
+      </p:pic>
+      <p:pic>
+        <p:nvPicPr>
+          <p:cNvPr id="59" name="Graphic 58" descr="End with solid fill">
+            <a:extLst>
+              <a:ext uri="{FF2B5EF4-FFF2-40B4-BE49-F238E27FC236}">
+                <a16:creationId xmlns:a16="http://schemas.microsoft.com/office/drawing/2014/main" id="{0EB2CE09-D574-2E9B-AD8E-42A88B816C51}"/>
+              </a:ext>
+            </a:extLst>
+          </p:cNvPr>
+          <p:cNvPicPr>
+            <a:picLocks noChangeAspect="1"/>
+          </p:cNvPicPr>
+          <p:nvPr/>
+        </p:nvPicPr>
+        <p:blipFill>
+          <a:blip r:embed="rId8">
+            <a:extLst>
+              <a:ext uri="{96DAC541-7B7A-43D3-8B79-37D633B846F1}">
+                <asvg:svgBlip xmlns:asvg="http://schemas.microsoft.com/office/drawing/2016/SVG/main" r:embed="rId9"/>
+              </a:ext>
+            </a:extLst>
+          </a:blip>
+          <a:stretch>
+            <a:fillRect/>
+          </a:stretch>
+        </p:blipFill>
+        <p:spPr>
+          <a:xfrm>
+            <a:off x="9264207" y="3651474"/>
+            <a:ext cx="2093057" cy="2093057"/>
+          </a:xfrm>
+          <a:prstGeom prst="rect">
+            <a:avLst/>
+          </a:prstGeom>
+        </p:spPr>
+      </p:pic>
+      <p:pic>
+        <p:nvPicPr>
+          <p:cNvPr id="60" name="Graphic 59" descr="End with solid fill">
+            <a:extLst>
+              <a:ext uri="{FF2B5EF4-FFF2-40B4-BE49-F238E27FC236}">
+                <a16:creationId xmlns:a16="http://schemas.microsoft.com/office/drawing/2014/main" id="{69411464-90B6-86F5-105F-7C8D25C40850}"/>
+              </a:ext>
+            </a:extLst>
+          </p:cNvPr>
+          <p:cNvPicPr>
+            <a:picLocks noChangeAspect="1"/>
+          </p:cNvPicPr>
+          <p:nvPr/>
+        </p:nvPicPr>
+        <p:blipFill rotWithShape="1">
+          <a:blip r:embed="rId8">
+            <a:extLst>
+              <a:ext uri="{96DAC541-7B7A-43D3-8B79-37D633B846F1}">
+                <asvg:svgBlip xmlns:asvg="http://schemas.microsoft.com/office/drawing/2016/SVG/main" r:embed="rId9"/>
+              </a:ext>
+            </a:extLst>
+          </a:blip>
+          <a:srcRect l="42413" t="-180" r="24822" b="180"/>
+          <a:stretch/>
+        </p:blipFill>
+        <p:spPr>
+          <a:xfrm flipH="1">
+            <a:off x="6645342" y="4940924"/>
+            <a:ext cx="685800" cy="2093057"/>
+          </a:xfrm>
+          <a:prstGeom prst="rect">
+            <a:avLst/>
+          </a:prstGeom>
+        </p:spPr>
+      </p:pic>
+      <p:pic>
+        <p:nvPicPr>
+          <p:cNvPr id="61" name="Graphic 60" descr="End with solid fill">
+            <a:extLst>
+              <a:ext uri="{FF2B5EF4-FFF2-40B4-BE49-F238E27FC236}">
+                <a16:creationId xmlns:a16="http://schemas.microsoft.com/office/drawing/2014/main" id="{E84AE1EB-8E9A-8651-6C61-1DE2AF2AEBC6}"/>
+              </a:ext>
+            </a:extLst>
+          </p:cNvPr>
+          <p:cNvPicPr>
+            <a:picLocks noChangeAspect="1"/>
+          </p:cNvPicPr>
+          <p:nvPr/>
+        </p:nvPicPr>
+        <p:blipFill>
+          <a:blip r:embed="rId8">
+            <a:extLst>
+              <a:ext uri="{96DAC541-7B7A-43D3-8B79-37D633B846F1}">
+                <asvg:svgBlip xmlns:asvg="http://schemas.microsoft.com/office/drawing/2016/SVG/main" r:embed="rId9"/>
+              </a:ext>
+            </a:extLst>
+          </a:blip>
+          <a:stretch>
+            <a:fillRect/>
+          </a:stretch>
+        </p:blipFill>
+        <p:spPr>
+          <a:xfrm flipH="1">
+            <a:off x="7184878" y="2350018"/>
+            <a:ext cx="2093057" cy="2093057"/>
+          </a:xfrm>
+          <a:prstGeom prst="rect">
+            <a:avLst/>
+          </a:prstGeom>
+        </p:spPr>
+      </p:pic>
     </p:spTree>
     <p:extLst>
       <p:ext uri="{BB962C8B-B14F-4D97-AF65-F5344CB8AC3E}">

</xml_diff>

<commit_message>
DEV #13 update refresh icon
</commit_message>
<xml_diff>
--- a/mdaviz/resources/icons.pptx
+++ b/mdaviz/resources/icons.pptx
@@ -5026,6 +5026,89 @@
           </a:prstGeom>
         </p:spPr>
       </p:pic>
+      <p:pic>
+        <p:nvPicPr>
+          <p:cNvPr id="65" name="Graphic 64" descr="Repeat outline">
+            <a:extLst>
+              <a:ext uri="{FF2B5EF4-FFF2-40B4-BE49-F238E27FC236}">
+                <a16:creationId xmlns:a16="http://schemas.microsoft.com/office/drawing/2014/main" id="{CEC70DB6-3225-CD76-618B-2672EE4C976B}"/>
+              </a:ext>
+            </a:extLst>
+          </p:cNvPr>
+          <p:cNvPicPr>
+            <a:picLocks noChangeAspect="1"/>
+          </p:cNvPicPr>
+          <p:nvPr/>
+        </p:nvPicPr>
+        <p:blipFill>
+          <a:blip r:embed="rId32">
+            <a:extLst>
+              <a:ext uri="{96DAC541-7B7A-43D3-8B79-37D633B846F1}">
+                <asvg:svgBlip xmlns:asvg="http://schemas.microsoft.com/office/drawing/2016/SVG/main" r:embed="rId33"/>
+              </a:ext>
+            </a:extLst>
+          </a:blip>
+          <a:stretch>
+            <a:fillRect/>
+          </a:stretch>
+        </p:blipFill>
+        <p:spPr>
+          <a:xfrm>
+            <a:off x="4528333" y="364330"/>
+            <a:ext cx="570434" cy="570434"/>
+          </a:xfrm>
+          <a:prstGeom prst="rect">
+            <a:avLst/>
+          </a:prstGeom>
+        </p:spPr>
+      </p:pic>
+      <p:pic>
+        <p:nvPicPr>
+          <p:cNvPr id="1026" name="Picture 2">
+            <a:extLst>
+              <a:ext uri="{FF2B5EF4-FFF2-40B4-BE49-F238E27FC236}">
+                <a16:creationId xmlns:a16="http://schemas.microsoft.com/office/drawing/2014/main" id="{96B1BBAA-3E3A-08BC-F15D-96A13921ACBD}"/>
+              </a:ext>
+            </a:extLst>
+          </p:cNvPr>
+          <p:cNvPicPr>
+            <a:picLocks noChangeAspect="1" noChangeArrowheads="1"/>
+          </p:cNvPicPr>
+          <p:nvPr/>
+        </p:nvPicPr>
+        <p:blipFill>
+          <a:blip r:embed="rId34">
+            <a:extLst>
+              <a:ext uri="{28A0092B-C50C-407E-A947-70E740481C1C}">
+                <a14:useLocalDpi xmlns:a14="http://schemas.microsoft.com/office/drawing/2010/main" val="0"/>
+              </a:ext>
+            </a:extLst>
+          </a:blip>
+          <a:srcRect/>
+          <a:stretch>
+            <a:fillRect/>
+          </a:stretch>
+        </p:blipFill>
+        <p:spPr bwMode="auto">
+          <a:xfrm>
+            <a:off x="2776095" y="4763105"/>
+            <a:ext cx="2103120" cy="2103120"/>
+          </a:xfrm>
+          <a:prstGeom prst="rect">
+            <a:avLst/>
+          </a:prstGeom>
+          <a:noFill/>
+          <a:extLst>
+            <a:ext uri="{909E8E84-426E-40DD-AFC4-6F175D3DCCD1}">
+              <a14:hiddenFill xmlns:a14="http://schemas.microsoft.com/office/drawing/2010/main">
+                <a:solidFill>
+                  <a:srgbClr val="FFFFFF"/>
+                </a:solidFill>
+              </a14:hiddenFill>
+            </a:ext>
+          </a:extLst>
+        </p:spPr>
+      </p:pic>
     </p:spTree>
     <p:extLst>
       <p:ext uri="{BB962C8B-B14F-4D97-AF65-F5344CB8AC3E}">

</xml_diff>

<commit_message>
DEV #15 add open button
</commit_message>
<xml_diff>
--- a/mdaviz/resources/icons.pptx
+++ b/mdaviz/resources/icons.pptx
@@ -6,6 +6,7 @@
   </p:sldMasterIdLst>
   <p:sldIdLst>
     <p:sldId id="3912" r:id="rId2"/>
+    <p:sldId id="3913" r:id="rId3"/>
   </p:sldIdLst>
   <p:sldSz cx="12192000" cy="6858000"/>
   <p:notesSz cx="6858000" cy="9144000"/>
@@ -259,7 +260,7 @@
           <a:p>
             <a:fld id="{972982F3-053C-7B4D-A5CF-EFE18F3D02A0}" type="datetimeFigureOut">
               <a:rPr lang="en-US" smtClean="0"/>
-              <a:t>9/1/23</a:t>
+              <a:t>9/3/23</a:t>
             </a:fld>
             <a:endParaRPr lang="en-US"/>
           </a:p>
@@ -457,7 +458,7 @@
           <a:p>
             <a:fld id="{972982F3-053C-7B4D-A5CF-EFE18F3D02A0}" type="datetimeFigureOut">
               <a:rPr lang="en-US" smtClean="0"/>
-              <a:t>9/1/23</a:t>
+              <a:t>9/3/23</a:t>
             </a:fld>
             <a:endParaRPr lang="en-US"/>
           </a:p>
@@ -665,7 +666,7 @@
           <a:p>
             <a:fld id="{972982F3-053C-7B4D-A5CF-EFE18F3D02A0}" type="datetimeFigureOut">
               <a:rPr lang="en-US" smtClean="0"/>
-              <a:t>9/1/23</a:t>
+              <a:t>9/3/23</a:t>
             </a:fld>
             <a:endParaRPr lang="en-US"/>
           </a:p>
@@ -863,7 +864,7 @@
           <a:p>
             <a:fld id="{972982F3-053C-7B4D-A5CF-EFE18F3D02A0}" type="datetimeFigureOut">
               <a:rPr lang="en-US" smtClean="0"/>
-              <a:t>9/1/23</a:t>
+              <a:t>9/3/23</a:t>
             </a:fld>
             <a:endParaRPr lang="en-US"/>
           </a:p>
@@ -1138,7 +1139,7 @@
           <a:p>
             <a:fld id="{972982F3-053C-7B4D-A5CF-EFE18F3D02A0}" type="datetimeFigureOut">
               <a:rPr lang="en-US" smtClean="0"/>
-              <a:t>9/1/23</a:t>
+              <a:t>9/3/23</a:t>
             </a:fld>
             <a:endParaRPr lang="en-US"/>
           </a:p>
@@ -1403,7 +1404,7 @@
           <a:p>
             <a:fld id="{972982F3-053C-7B4D-A5CF-EFE18F3D02A0}" type="datetimeFigureOut">
               <a:rPr lang="en-US" smtClean="0"/>
-              <a:t>9/1/23</a:t>
+              <a:t>9/3/23</a:t>
             </a:fld>
             <a:endParaRPr lang="en-US"/>
           </a:p>
@@ -1815,7 +1816,7 @@
           <a:p>
             <a:fld id="{972982F3-053C-7B4D-A5CF-EFE18F3D02A0}" type="datetimeFigureOut">
               <a:rPr lang="en-US" smtClean="0"/>
-              <a:t>9/1/23</a:t>
+              <a:t>9/3/23</a:t>
             </a:fld>
             <a:endParaRPr lang="en-US"/>
           </a:p>
@@ -1956,7 +1957,7 @@
           <a:p>
             <a:fld id="{972982F3-053C-7B4D-A5CF-EFE18F3D02A0}" type="datetimeFigureOut">
               <a:rPr lang="en-US" smtClean="0"/>
-              <a:t>9/1/23</a:t>
+              <a:t>9/3/23</a:t>
             </a:fld>
             <a:endParaRPr lang="en-US"/>
           </a:p>
@@ -2069,7 +2070,7 @@
           <a:p>
             <a:fld id="{972982F3-053C-7B4D-A5CF-EFE18F3D02A0}" type="datetimeFigureOut">
               <a:rPr lang="en-US" smtClean="0"/>
-              <a:t>9/1/23</a:t>
+              <a:t>9/3/23</a:t>
             </a:fld>
             <a:endParaRPr lang="en-US"/>
           </a:p>
@@ -2380,7 +2381,7 @@
           <a:p>
             <a:fld id="{972982F3-053C-7B4D-A5CF-EFE18F3D02A0}" type="datetimeFigureOut">
               <a:rPr lang="en-US" smtClean="0"/>
-              <a:t>9/1/23</a:t>
+              <a:t>9/3/23</a:t>
             </a:fld>
             <a:endParaRPr lang="en-US"/>
           </a:p>
@@ -2668,7 +2669,7 @@
           <a:p>
             <a:fld id="{972982F3-053C-7B4D-A5CF-EFE18F3D02A0}" type="datetimeFigureOut">
               <a:rPr lang="en-US" smtClean="0"/>
-              <a:t>9/1/23</a:t>
+              <a:t>9/3/23</a:t>
             </a:fld>
             <a:endParaRPr lang="en-US"/>
           </a:p>
@@ -2909,7 +2910,7 @@
           <a:p>
             <a:fld id="{972982F3-053C-7B4D-A5CF-EFE18F3D02A0}" type="datetimeFigureOut">
               <a:rPr lang="en-US" smtClean="0"/>
-              <a:t>9/1/23</a:t>
+              <a:t>9/3/23</a:t>
             </a:fld>
             <a:endParaRPr lang="en-US"/>
           </a:p>
@@ -3328,6 +3329,489 @@
       </p:grpSpPr>
       <p:grpSp>
         <p:nvGrpSpPr>
+          <p:cNvPr id="17" name="Group 16">
+            <a:extLst>
+              <a:ext uri="{FF2B5EF4-FFF2-40B4-BE49-F238E27FC236}">
+                <a16:creationId xmlns:a16="http://schemas.microsoft.com/office/drawing/2014/main" id="{BBC21200-15DD-FF4F-8E44-2830D8478953}"/>
+              </a:ext>
+            </a:extLst>
+          </p:cNvPr>
+          <p:cNvGrpSpPr/>
+          <p:nvPr/>
+        </p:nvGrpSpPr>
+        <p:grpSpPr>
+          <a:xfrm>
+            <a:off x="679619" y="597856"/>
+            <a:ext cx="2034652" cy="2206705"/>
+            <a:chOff x="679619" y="597856"/>
+            <a:chExt cx="2034652" cy="2206705"/>
+          </a:xfrm>
+        </p:grpSpPr>
+        <p:grpSp>
+          <p:nvGrpSpPr>
+            <p:cNvPr id="19" name="Group 18">
+              <a:extLst>
+                <a:ext uri="{FF2B5EF4-FFF2-40B4-BE49-F238E27FC236}">
+                  <a16:creationId xmlns:a16="http://schemas.microsoft.com/office/drawing/2014/main" id="{7EEA9AD0-A765-0B4D-8210-0492A397F43D}"/>
+                </a:ext>
+              </a:extLst>
+            </p:cNvPr>
+            <p:cNvGrpSpPr/>
+            <p:nvPr/>
+          </p:nvGrpSpPr>
+          <p:grpSpPr>
+            <a:xfrm>
+              <a:off x="1046411" y="597856"/>
+              <a:ext cx="948407" cy="1504756"/>
+              <a:chOff x="9907026" y="704334"/>
+              <a:chExt cx="948407" cy="1504756"/>
+            </a:xfrm>
+          </p:grpSpPr>
+          <p:sp>
+            <p:nvSpPr>
+              <p:cNvPr id="20" name="Oval 19">
+                <a:extLst>
+                  <a:ext uri="{FF2B5EF4-FFF2-40B4-BE49-F238E27FC236}">
+                    <a16:creationId xmlns:a16="http://schemas.microsoft.com/office/drawing/2014/main" id="{56E10A75-4D24-7A4B-A834-F6BEFF9865E8}"/>
+                  </a:ext>
+                </a:extLst>
+              </p:cNvPr>
+              <p:cNvSpPr/>
+              <p:nvPr/>
+            </p:nvSpPr>
+            <p:spPr>
+              <a:xfrm>
+                <a:off x="9921794" y="704334"/>
+                <a:ext cx="897924" cy="897924"/>
+              </a:xfrm>
+              <a:prstGeom prst="ellipse">
+                <a:avLst/>
+              </a:prstGeom>
+              <a:ln w="57150">
+                <a:solidFill>
+                  <a:schemeClr val="tx1"/>
+                </a:solidFill>
+              </a:ln>
+            </p:spPr>
+            <p:style>
+              <a:lnRef idx="2">
+                <a:schemeClr val="dk1"/>
+              </a:lnRef>
+              <a:fillRef idx="1">
+                <a:schemeClr val="lt1"/>
+              </a:fillRef>
+              <a:effectRef idx="0">
+                <a:schemeClr val="dk1"/>
+              </a:effectRef>
+              <a:fontRef idx="minor">
+                <a:schemeClr val="dk1"/>
+              </a:fontRef>
+            </p:style>
+            <p:txBody>
+              <a:bodyPr rtlCol="0" anchor="ctr"/>
+              <a:lstStyle/>
+              <a:p>
+                <a:pPr algn="ctr"/>
+                <a:endParaRPr lang="en-US"/>
+              </a:p>
+            </p:txBody>
+          </p:sp>
+          <p:sp>
+            <p:nvSpPr>
+              <p:cNvPr id="21" name="Rectangle 20">
+                <a:extLst>
+                  <a:ext uri="{FF2B5EF4-FFF2-40B4-BE49-F238E27FC236}">
+                    <a16:creationId xmlns:a16="http://schemas.microsoft.com/office/drawing/2014/main" id="{EE5C121F-8338-434F-8D14-C01C747AEDC3}"/>
+                  </a:ext>
+                </a:extLst>
+              </p:cNvPr>
+              <p:cNvSpPr/>
+              <p:nvPr/>
+            </p:nvSpPr>
+            <p:spPr>
+              <a:xfrm rot="2700000">
+                <a:off x="9922303" y="1275959"/>
+                <a:ext cx="917854" cy="948407"/>
+              </a:xfrm>
+              <a:prstGeom prst="rect">
+                <a:avLst/>
+              </a:prstGeom>
+              <a:solidFill>
+                <a:schemeClr val="bg1"/>
+              </a:solidFill>
+              <a:ln>
+                <a:solidFill>
+                  <a:schemeClr val="bg1"/>
+                </a:solidFill>
+              </a:ln>
+            </p:spPr>
+            <p:style>
+              <a:lnRef idx="2">
+                <a:schemeClr val="accent1">
+                  <a:shade val="50000"/>
+                </a:schemeClr>
+              </a:lnRef>
+              <a:fillRef idx="1">
+                <a:schemeClr val="accent1"/>
+              </a:fillRef>
+              <a:effectRef idx="0">
+                <a:schemeClr val="accent1"/>
+              </a:effectRef>
+              <a:fontRef idx="minor">
+                <a:schemeClr val="lt1"/>
+              </a:fontRef>
+            </p:style>
+            <p:txBody>
+              <a:bodyPr rtlCol="0" anchor="ctr"/>
+              <a:lstStyle/>
+              <a:p>
+                <a:pPr algn="ctr"/>
+                <a:endParaRPr lang="en-US"/>
+              </a:p>
+            </p:txBody>
+          </p:sp>
+        </p:grpSp>
+        <p:pic>
+          <p:nvPicPr>
+            <p:cNvPr id="5" name="Graphic 4" descr="Right pointing backhand index outline">
+              <a:extLst>
+                <a:ext uri="{FF2B5EF4-FFF2-40B4-BE49-F238E27FC236}">
+                  <a16:creationId xmlns:a16="http://schemas.microsoft.com/office/drawing/2014/main" id="{20A440B0-5BD8-6F46-9271-0B90610F061D}"/>
+                </a:ext>
+              </a:extLst>
+            </p:cNvPr>
+            <p:cNvPicPr>
+              <a:picLocks noChangeAspect="1"/>
+            </p:cNvPicPr>
+            <p:nvPr/>
+          </p:nvPicPr>
+          <p:blipFill>
+            <a:blip r:embed="rId2">
+              <a:extLst>
+                <a:ext uri="{96DAC541-7B7A-43D3-8B79-37D633B846F1}">
+                  <asvg:svgBlip xmlns:asvg="http://schemas.microsoft.com/office/drawing/2016/SVG/main" r:embed="rId3"/>
+                </a:ext>
+              </a:extLst>
+            </a:blip>
+            <a:stretch>
+              <a:fillRect/>
+            </a:stretch>
+          </p:blipFill>
+          <p:spPr>
+            <a:xfrm rot="16200000">
+              <a:off x="679619" y="769909"/>
+              <a:ext cx="2034652" cy="2034652"/>
+            </a:xfrm>
+            <a:prstGeom prst="rect">
+              <a:avLst/>
+            </a:prstGeom>
+          </p:spPr>
+        </p:pic>
+      </p:grpSp>
+      <p:pic>
+        <p:nvPicPr>
+          <p:cNvPr id="58" name="Graphic 57" descr="End with solid fill">
+            <a:extLst>
+              <a:ext uri="{FF2B5EF4-FFF2-40B4-BE49-F238E27FC236}">
+                <a16:creationId xmlns:a16="http://schemas.microsoft.com/office/drawing/2014/main" id="{C0181D33-31E1-BF54-7F01-B58C12BB9FFC}"/>
+              </a:ext>
+            </a:extLst>
+          </p:cNvPr>
+          <p:cNvPicPr>
+            <a:picLocks noChangeAspect="1"/>
+          </p:cNvPicPr>
+          <p:nvPr/>
+        </p:nvPicPr>
+        <p:blipFill rotWithShape="1">
+          <a:blip r:embed="rId4">
+            <a:extLst>
+              <a:ext uri="{96DAC541-7B7A-43D3-8B79-37D633B846F1}">
+                <asvg:svgBlip xmlns:asvg="http://schemas.microsoft.com/office/drawing/2016/SVG/main" r:embed="rId5"/>
+              </a:ext>
+            </a:extLst>
+          </a:blip>
+          <a:srcRect l="42413" t="-180" r="24822" b="180"/>
+          <a:stretch/>
+        </p:blipFill>
+        <p:spPr>
+          <a:xfrm>
+            <a:off x="5760720" y="4773168"/>
+            <a:ext cx="685800" cy="2093057"/>
+          </a:xfrm>
+          <a:prstGeom prst="rect">
+            <a:avLst/>
+          </a:prstGeom>
+        </p:spPr>
+      </p:pic>
+      <p:pic>
+        <p:nvPicPr>
+          <p:cNvPr id="59" name="Graphic 58" descr="End with solid fill">
+            <a:extLst>
+              <a:ext uri="{FF2B5EF4-FFF2-40B4-BE49-F238E27FC236}">
+                <a16:creationId xmlns:a16="http://schemas.microsoft.com/office/drawing/2014/main" id="{0EB2CE09-D574-2E9B-AD8E-42A88B816C51}"/>
+              </a:ext>
+            </a:extLst>
+          </p:cNvPr>
+          <p:cNvPicPr>
+            <a:picLocks noChangeAspect="1"/>
+          </p:cNvPicPr>
+          <p:nvPr/>
+        </p:nvPicPr>
+        <p:blipFill>
+          <a:blip r:embed="rId4">
+            <a:extLst>
+              <a:ext uri="{96DAC541-7B7A-43D3-8B79-37D633B846F1}">
+                <asvg:svgBlip xmlns:asvg="http://schemas.microsoft.com/office/drawing/2016/SVG/main" r:embed="rId5"/>
+              </a:ext>
+            </a:extLst>
+          </a:blip>
+          <a:stretch>
+            <a:fillRect/>
+          </a:stretch>
+        </p:blipFill>
+        <p:spPr>
+          <a:xfrm>
+            <a:off x="9264207" y="3651474"/>
+            <a:ext cx="2093057" cy="2093057"/>
+          </a:xfrm>
+          <a:prstGeom prst="rect">
+            <a:avLst/>
+          </a:prstGeom>
+        </p:spPr>
+      </p:pic>
+      <p:pic>
+        <p:nvPicPr>
+          <p:cNvPr id="60" name="Graphic 59" descr="End with solid fill">
+            <a:extLst>
+              <a:ext uri="{FF2B5EF4-FFF2-40B4-BE49-F238E27FC236}">
+                <a16:creationId xmlns:a16="http://schemas.microsoft.com/office/drawing/2014/main" id="{69411464-90B6-86F5-105F-7C8D25C40850}"/>
+              </a:ext>
+            </a:extLst>
+          </p:cNvPr>
+          <p:cNvPicPr>
+            <a:picLocks noChangeAspect="1"/>
+          </p:cNvPicPr>
+          <p:nvPr/>
+        </p:nvPicPr>
+        <p:blipFill rotWithShape="1">
+          <a:blip r:embed="rId4">
+            <a:extLst>
+              <a:ext uri="{96DAC541-7B7A-43D3-8B79-37D633B846F1}">
+                <asvg:svgBlip xmlns:asvg="http://schemas.microsoft.com/office/drawing/2016/SVG/main" r:embed="rId5"/>
+              </a:ext>
+            </a:extLst>
+          </a:blip>
+          <a:srcRect l="42413" t="-180" r="24822" b="180"/>
+          <a:stretch/>
+        </p:blipFill>
+        <p:spPr>
+          <a:xfrm flipH="1">
+            <a:off x="6645342" y="4940924"/>
+            <a:ext cx="685800" cy="2093057"/>
+          </a:xfrm>
+          <a:prstGeom prst="rect">
+            <a:avLst/>
+          </a:prstGeom>
+        </p:spPr>
+      </p:pic>
+      <p:pic>
+        <p:nvPicPr>
+          <p:cNvPr id="61" name="Graphic 60" descr="End with solid fill">
+            <a:extLst>
+              <a:ext uri="{FF2B5EF4-FFF2-40B4-BE49-F238E27FC236}">
+                <a16:creationId xmlns:a16="http://schemas.microsoft.com/office/drawing/2014/main" id="{E84AE1EB-8E9A-8651-6C61-1DE2AF2AEBC6}"/>
+              </a:ext>
+            </a:extLst>
+          </p:cNvPr>
+          <p:cNvPicPr>
+            <a:picLocks noChangeAspect="1"/>
+          </p:cNvPicPr>
+          <p:nvPr/>
+        </p:nvPicPr>
+        <p:blipFill>
+          <a:blip r:embed="rId4">
+            <a:extLst>
+              <a:ext uri="{96DAC541-7B7A-43D3-8B79-37D633B846F1}">
+                <asvg:svgBlip xmlns:asvg="http://schemas.microsoft.com/office/drawing/2016/SVG/main" r:embed="rId5"/>
+              </a:ext>
+            </a:extLst>
+          </a:blip>
+          <a:stretch>
+            <a:fillRect/>
+          </a:stretch>
+        </p:blipFill>
+        <p:spPr>
+          <a:xfrm flipH="1">
+            <a:off x="7184878" y="2350018"/>
+            <a:ext cx="2093057" cy="2093057"/>
+          </a:xfrm>
+          <a:prstGeom prst="rect">
+            <a:avLst/>
+          </a:prstGeom>
+        </p:spPr>
+      </p:pic>
+      <p:pic>
+        <p:nvPicPr>
+          <p:cNvPr id="1026" name="Picture 2">
+            <a:extLst>
+              <a:ext uri="{FF2B5EF4-FFF2-40B4-BE49-F238E27FC236}">
+                <a16:creationId xmlns:a16="http://schemas.microsoft.com/office/drawing/2014/main" id="{96B1BBAA-3E3A-08BC-F15D-96A13921ACBD}"/>
+              </a:ext>
+            </a:extLst>
+          </p:cNvPr>
+          <p:cNvPicPr>
+            <a:picLocks noChangeAspect="1" noChangeArrowheads="1"/>
+          </p:cNvPicPr>
+          <p:nvPr/>
+        </p:nvPicPr>
+        <p:blipFill>
+          <a:blip r:embed="rId6">
+            <a:extLst>
+              <a:ext uri="{28A0092B-C50C-407E-A947-70E740481C1C}">
+                <a14:useLocalDpi xmlns:a14="http://schemas.microsoft.com/office/drawing/2010/main" val="0"/>
+              </a:ext>
+            </a:extLst>
+          </a:blip>
+          <a:srcRect/>
+          <a:stretch>
+            <a:fillRect/>
+          </a:stretch>
+        </p:blipFill>
+        <p:spPr bwMode="auto">
+          <a:xfrm>
+            <a:off x="2776095" y="4763105"/>
+            <a:ext cx="2103120" cy="2103120"/>
+          </a:xfrm>
+          <a:prstGeom prst="rect">
+            <a:avLst/>
+          </a:prstGeom>
+          <a:noFill/>
+          <a:extLst>
+            <a:ext uri="{909E8E84-426E-40DD-AFC4-6F175D3DCCD1}">
+              <a14:hiddenFill xmlns:a14="http://schemas.microsoft.com/office/drawing/2010/main">
+                <a:solidFill>
+                  <a:srgbClr val="FFFFFF"/>
+                </a:solidFill>
+              </a14:hiddenFill>
+            </a:ext>
+          </a:extLst>
+        </p:spPr>
+      </p:pic>
+      <p:pic>
+        <p:nvPicPr>
+          <p:cNvPr id="10" name="Graphic 9" descr="Open folder outline">
+            <a:extLst>
+              <a:ext uri="{FF2B5EF4-FFF2-40B4-BE49-F238E27FC236}">
+                <a16:creationId xmlns:a16="http://schemas.microsoft.com/office/drawing/2014/main" id="{25B0BC60-80E6-554B-A1DC-52B8D4899279}"/>
+              </a:ext>
+            </a:extLst>
+          </p:cNvPr>
+          <p:cNvPicPr>
+            <a:picLocks noChangeAspect="1"/>
+          </p:cNvPicPr>
+          <p:nvPr/>
+        </p:nvPicPr>
+        <p:blipFill>
+          <a:blip r:embed="rId7">
+            <a:extLst>
+              <a:ext uri="{96DAC541-7B7A-43D3-8B79-37D633B846F1}">
+                <asvg:svgBlip xmlns:asvg="http://schemas.microsoft.com/office/drawing/2016/SVG/main" r:embed="rId8"/>
+              </a:ext>
+            </a:extLst>
+          </a:blip>
+          <a:stretch>
+            <a:fillRect/>
+          </a:stretch>
+        </p:blipFill>
+        <p:spPr>
+          <a:xfrm>
+            <a:off x="4113503" y="1446503"/>
+            <a:ext cx="2439697" cy="2439697"/>
+          </a:xfrm>
+          <a:prstGeom prst="rect">
+            <a:avLst/>
+          </a:prstGeom>
+        </p:spPr>
+      </p:pic>
+      <p:pic>
+        <p:nvPicPr>
+          <p:cNvPr id="12" name="Picture 2" descr="Refresh, reload icon - Free download on Iconfinder">
+            <a:extLst>
+              <a:ext uri="{FF2B5EF4-FFF2-40B4-BE49-F238E27FC236}">
+                <a16:creationId xmlns:a16="http://schemas.microsoft.com/office/drawing/2014/main" id="{72DA2C45-BA7F-5148-8B6B-B5D6135F5F18}"/>
+              </a:ext>
+            </a:extLst>
+          </p:cNvPr>
+          <p:cNvPicPr>
+            <a:picLocks noChangeAspect="1" noChangeArrowheads="1"/>
+          </p:cNvPicPr>
+          <p:nvPr/>
+        </p:nvPicPr>
+        <p:blipFill>
+          <a:blip r:embed="rId9">
+            <a:extLst>
+              <a:ext uri="{28A0092B-C50C-407E-A947-70E740481C1C}">
+                <a14:useLocalDpi xmlns:a14="http://schemas.microsoft.com/office/drawing/2010/main" val="0"/>
+              </a:ext>
+            </a:extLst>
+          </a:blip>
+          <a:srcRect/>
+          <a:stretch>
+            <a:fillRect/>
+          </a:stretch>
+        </p:blipFill>
+        <p:spPr bwMode="auto">
+          <a:xfrm>
+            <a:off x="311090" y="3429000"/>
+            <a:ext cx="2805934" cy="2805934"/>
+          </a:xfrm>
+          <a:prstGeom prst="rect">
+            <a:avLst/>
+          </a:prstGeom>
+          <a:noFill/>
+          <a:extLst>
+            <a:ext uri="{909E8E84-426E-40DD-AFC4-6F175D3DCCD1}">
+              <a14:hiddenFill xmlns:a14="http://schemas.microsoft.com/office/drawing/2010/main">
+                <a:solidFill>
+                  <a:srgbClr val="FFFFFF"/>
+                </a:solidFill>
+              </a14:hiddenFill>
+            </a:ext>
+          </a:extLst>
+        </p:spPr>
+      </p:pic>
+    </p:spTree>
+    <p:extLst>
+      <p:ext uri="{BB962C8B-B14F-4D97-AF65-F5344CB8AC3E}">
+        <p14:creationId xmlns:p14="http://schemas.microsoft.com/office/powerpoint/2010/main" val="3282455278"/>
+      </p:ext>
+    </p:extLst>
+  </p:cSld>
+  <p:clrMapOvr>
+    <a:masterClrMapping/>
+  </p:clrMapOvr>
+</p:sld>
+</file>
+
+<file path=ppt/slides/slide2.xml><?xml version="1.0" encoding="utf-8"?>
+<p:sld xmlns:a="http://schemas.openxmlformats.org/drawingml/2006/main" xmlns:r="http://schemas.openxmlformats.org/officeDocument/2006/relationships" xmlns:p="http://schemas.openxmlformats.org/presentationml/2006/main">
+  <p:cSld>
+    <p:spTree>
+      <p:nvGrpSpPr>
+        <p:cNvPr id="1" name=""/>
+        <p:cNvGrpSpPr/>
+        <p:nvPr/>
+      </p:nvGrpSpPr>
+      <p:grpSpPr>
+        <a:xfrm>
+          <a:off x="0" y="0"/>
+          <a:ext cx="0" cy="0"/>
+          <a:chOff x="0" y="0"/>
+          <a:chExt cx="0" cy="0"/>
+        </a:xfrm>
+      </p:grpSpPr>
+      <p:grpSp>
+        <p:nvGrpSpPr>
           <p:cNvPr id="15" name="Group 14">
             <a:extLst>
               <a:ext uri="{FF2B5EF4-FFF2-40B4-BE49-F238E27FC236}">
@@ -5109,10 +5593,50 @@
           </a:extLst>
         </p:spPr>
       </p:pic>
+      <p:sp>
+        <p:nvSpPr>
+          <p:cNvPr id="50" name="TextBox 49">
+            <a:extLst>
+              <a:ext uri="{FF2B5EF4-FFF2-40B4-BE49-F238E27FC236}">
+                <a16:creationId xmlns:a16="http://schemas.microsoft.com/office/drawing/2014/main" id="{F94D2BA8-529C-374C-9B5F-7B24D963DBAE}"/>
+              </a:ext>
+            </a:extLst>
+          </p:cNvPr>
+          <p:cNvSpPr txBox="1"/>
+          <p:nvPr/>
+        </p:nvSpPr>
+        <p:spPr>
+          <a:xfrm>
+            <a:off x="1967948" y="3298999"/>
+            <a:ext cx="6818242" cy="369332"/>
+          </a:xfrm>
+          <a:prstGeom prst="rect">
+            <a:avLst/>
+          </a:prstGeom>
+          <a:noFill/>
+        </p:spPr>
+        <p:txBody>
+          <a:bodyPr wrap="square">
+            <a:spAutoFit/>
+          </a:bodyPr>
+          <a:lstStyle/>
+          <a:p>
+            <a:r>
+              <a:rPr lang="en-US" dirty="0"/>
+              <a:t>create </a:t>
+            </a:r>
+            <a:r>
+              <a:rPr lang="en-US" dirty="0" err="1"/>
+              <a:t>opendialog.ui</a:t>
+            </a:r>
+            <a:endParaRPr lang="en-US" dirty="0"/>
+          </a:p>
+        </p:txBody>
+      </p:sp>
     </p:spTree>
     <p:extLst>
       <p:ext uri="{BB962C8B-B14F-4D97-AF65-F5344CB8AC3E}">
-        <p14:creationId xmlns:p14="http://schemas.microsoft.com/office/powerpoint/2010/main" val="3282455278"/>
+        <p14:creationId xmlns:p14="http://schemas.microsoft.com/office/powerpoint/2010/main" val="1046389049"/>
       </p:ext>
     </p:extLst>
   </p:cSld>

</xml_diff>

<commit_message>
DEV #9 start implementing settings
</commit_message>
<xml_diff>
--- a/mdaviz/resources/icons.pptx
+++ b/mdaviz/resources/icons.pptx
@@ -3667,6 +3667,15 @@
         <p:blipFill>
           <a:blip r:embed="rId6">
             <a:extLst>
+              <a:ext uri="{BEBA8EAE-BF5A-486C-A8C5-ECC9F3942E4B}">
+                <a14:imgProps xmlns:a14="http://schemas.microsoft.com/office/drawing/2010/main">
+                  <a14:imgLayer r:embed="rId7">
+                    <a14:imgEffect>
+                      <a14:brightnessContrast bright="-40000" contrast="40000"/>
+                    </a14:imgEffect>
+                  </a14:imgLayer>
+                </a14:imgProps>
+              </a:ext>
               <a:ext uri="{28A0092B-C50C-407E-A947-70E740481C1C}">
                 <a14:useLocalDpi xmlns:a14="http://schemas.microsoft.com/office/drawing/2010/main" val="0"/>
               </a:ext>
@@ -3679,7 +3688,7 @@
         </p:blipFill>
         <p:spPr bwMode="auto">
           <a:xfrm>
-            <a:off x="2776095" y="4763105"/>
+            <a:off x="6133318" y="246898"/>
             <a:ext cx="2103120" cy="2103120"/>
           </a:xfrm>
           <a:prstGeom prst="rect">
@@ -3712,10 +3721,10 @@
           <p:nvPr/>
         </p:nvPicPr>
         <p:blipFill>
-          <a:blip r:embed="rId7">
+          <a:blip r:embed="rId8">
             <a:extLst>
               <a:ext uri="{96DAC541-7B7A-43D3-8B79-37D633B846F1}">
-                <asvg:svgBlip xmlns:asvg="http://schemas.microsoft.com/office/drawing/2016/SVG/main" r:embed="rId8"/>
+                <asvg:svgBlip xmlns:asvg="http://schemas.microsoft.com/office/drawing/2016/SVG/main" r:embed="rId9"/>
               </a:ext>
             </a:extLst>
           </a:blip>
@@ -3735,49 +3744,38 @@
       </p:pic>
       <p:pic>
         <p:nvPicPr>
-          <p:cNvPr id="12" name="Picture 2" descr="Refresh, reload icon - Free download on Iconfinder">
-            <a:extLst>
-              <a:ext uri="{FF2B5EF4-FFF2-40B4-BE49-F238E27FC236}">
-                <a16:creationId xmlns:a16="http://schemas.microsoft.com/office/drawing/2014/main" id="{72DA2C45-BA7F-5148-8B6B-B5D6135F5F18}"/>
+          <p:cNvPr id="14" name="Graphic 13" descr="Open folder with solid fill">
+            <a:extLst>
+              <a:ext uri="{FF2B5EF4-FFF2-40B4-BE49-F238E27FC236}">
+                <a16:creationId xmlns:a16="http://schemas.microsoft.com/office/drawing/2014/main" id="{D9B76CC9-EEEF-5E45-9755-D009491A4763}"/>
               </a:ext>
             </a:extLst>
           </p:cNvPr>
           <p:cNvPicPr>
-            <a:picLocks noChangeAspect="1" noChangeArrowheads="1"/>
+            <a:picLocks noChangeAspect="1"/>
           </p:cNvPicPr>
           <p:nvPr/>
         </p:nvPicPr>
         <p:blipFill>
-          <a:blip r:embed="rId9">
-            <a:extLst>
-              <a:ext uri="{28A0092B-C50C-407E-A947-70E740481C1C}">
-                <a14:useLocalDpi xmlns:a14="http://schemas.microsoft.com/office/drawing/2010/main" val="0"/>
+          <a:blip r:embed="rId10">
+            <a:extLst>
+              <a:ext uri="{96DAC541-7B7A-43D3-8B79-37D633B846F1}">
+                <asvg:svgBlip xmlns:asvg="http://schemas.microsoft.com/office/drawing/2016/SVG/main" r:embed="rId11"/>
               </a:ext>
             </a:extLst>
           </a:blip>
-          <a:srcRect/>
           <a:stretch>
             <a:fillRect/>
           </a:stretch>
         </p:blipFill>
-        <p:spPr bwMode="auto">
+        <p:spPr>
           <a:xfrm>
-            <a:off x="311090" y="3429000"/>
-            <a:ext cx="2805934" cy="2805934"/>
+            <a:off x="9277935" y="-189353"/>
+            <a:ext cx="2093056" cy="2093056"/>
           </a:xfrm>
           <a:prstGeom prst="rect">
             <a:avLst/>
           </a:prstGeom>
-          <a:noFill/>
-          <a:extLst>
-            <a:ext uri="{909E8E84-426E-40DD-AFC4-6F175D3DCCD1}">
-              <a14:hiddenFill xmlns:a14="http://schemas.microsoft.com/office/drawing/2010/main">
-                <a:solidFill>
-                  <a:srgbClr val="FFFFFF"/>
-                </a:solidFill>
-              </a14:hiddenFill>
-            </a:ext>
-          </a:extLst>
         </p:spPr>
       </p:pic>
     </p:spTree>

</xml_diff>

<commit_message>
ENH #72 Add forward backward buttons to folder ui.
</commit_message>
<xml_diff>
--- a/mdaviz/resources/icons.pptx
+++ b/mdaviz/resources/icons.pptx
@@ -260,7 +260,7 @@
           <a:p>
             <a:fld id="{972982F3-053C-7B4D-A5CF-EFE18F3D02A0}" type="datetimeFigureOut">
               <a:rPr lang="en-US" smtClean="0"/>
-              <a:t>9/3/23</a:t>
+              <a:t>2/10/24</a:t>
             </a:fld>
             <a:endParaRPr lang="en-US"/>
           </a:p>
@@ -458,7 +458,7 @@
           <a:p>
             <a:fld id="{972982F3-053C-7B4D-A5CF-EFE18F3D02A0}" type="datetimeFigureOut">
               <a:rPr lang="en-US" smtClean="0"/>
-              <a:t>9/3/23</a:t>
+              <a:t>2/10/24</a:t>
             </a:fld>
             <a:endParaRPr lang="en-US"/>
           </a:p>
@@ -666,7 +666,7 @@
           <a:p>
             <a:fld id="{972982F3-053C-7B4D-A5CF-EFE18F3D02A0}" type="datetimeFigureOut">
               <a:rPr lang="en-US" smtClean="0"/>
-              <a:t>9/3/23</a:t>
+              <a:t>2/10/24</a:t>
             </a:fld>
             <a:endParaRPr lang="en-US"/>
           </a:p>
@@ -864,7 +864,7 @@
           <a:p>
             <a:fld id="{972982F3-053C-7B4D-A5CF-EFE18F3D02A0}" type="datetimeFigureOut">
               <a:rPr lang="en-US" smtClean="0"/>
-              <a:t>9/3/23</a:t>
+              <a:t>2/10/24</a:t>
             </a:fld>
             <a:endParaRPr lang="en-US"/>
           </a:p>
@@ -1139,7 +1139,7 @@
           <a:p>
             <a:fld id="{972982F3-053C-7B4D-A5CF-EFE18F3D02A0}" type="datetimeFigureOut">
               <a:rPr lang="en-US" smtClean="0"/>
-              <a:t>9/3/23</a:t>
+              <a:t>2/10/24</a:t>
             </a:fld>
             <a:endParaRPr lang="en-US"/>
           </a:p>
@@ -1404,7 +1404,7 @@
           <a:p>
             <a:fld id="{972982F3-053C-7B4D-A5CF-EFE18F3D02A0}" type="datetimeFigureOut">
               <a:rPr lang="en-US" smtClean="0"/>
-              <a:t>9/3/23</a:t>
+              <a:t>2/10/24</a:t>
             </a:fld>
             <a:endParaRPr lang="en-US"/>
           </a:p>
@@ -1816,7 +1816,7 @@
           <a:p>
             <a:fld id="{972982F3-053C-7B4D-A5CF-EFE18F3D02A0}" type="datetimeFigureOut">
               <a:rPr lang="en-US" smtClean="0"/>
-              <a:t>9/3/23</a:t>
+              <a:t>2/10/24</a:t>
             </a:fld>
             <a:endParaRPr lang="en-US"/>
           </a:p>
@@ -1957,7 +1957,7 @@
           <a:p>
             <a:fld id="{972982F3-053C-7B4D-A5CF-EFE18F3D02A0}" type="datetimeFigureOut">
               <a:rPr lang="en-US" smtClean="0"/>
-              <a:t>9/3/23</a:t>
+              <a:t>2/10/24</a:t>
             </a:fld>
             <a:endParaRPr lang="en-US"/>
           </a:p>
@@ -2070,7 +2070,7 @@
           <a:p>
             <a:fld id="{972982F3-053C-7B4D-A5CF-EFE18F3D02A0}" type="datetimeFigureOut">
               <a:rPr lang="en-US" smtClean="0"/>
-              <a:t>9/3/23</a:t>
+              <a:t>2/10/24</a:t>
             </a:fld>
             <a:endParaRPr lang="en-US"/>
           </a:p>
@@ -2381,7 +2381,7 @@
           <a:p>
             <a:fld id="{972982F3-053C-7B4D-A5CF-EFE18F3D02A0}" type="datetimeFigureOut">
               <a:rPr lang="en-US" smtClean="0"/>
-              <a:t>9/3/23</a:t>
+              <a:t>2/10/24</a:t>
             </a:fld>
             <a:endParaRPr lang="en-US"/>
           </a:p>
@@ -2669,7 +2669,7 @@
           <a:p>
             <a:fld id="{972982F3-053C-7B4D-A5CF-EFE18F3D02A0}" type="datetimeFigureOut">
               <a:rPr lang="en-US" smtClean="0"/>
-              <a:t>9/3/23</a:t>
+              <a:t>2/10/24</a:t>
             </a:fld>
             <a:endParaRPr lang="en-US"/>
           </a:p>
@@ -2910,7 +2910,7 @@
           <a:p>
             <a:fld id="{972982F3-053C-7B4D-A5CF-EFE18F3D02A0}" type="datetimeFigureOut">
               <a:rPr lang="en-US" smtClean="0"/>
-              <a:t>9/3/23</a:t>
+              <a:t>2/10/24</a:t>
             </a:fld>
             <a:endParaRPr lang="en-US"/>
           </a:p>
@@ -3778,6 +3778,76 @@
           </a:prstGeom>
         </p:spPr>
       </p:pic>
+      <p:pic>
+        <p:nvPicPr>
+          <p:cNvPr id="15" name="Graphic 14" descr="End with solid fill">
+            <a:extLst>
+              <a:ext uri="{FF2B5EF4-FFF2-40B4-BE49-F238E27FC236}">
+                <a16:creationId xmlns:a16="http://schemas.microsoft.com/office/drawing/2014/main" id="{FB2EFB3C-D89C-5B4D-B8DE-5C6152AC6277}"/>
+              </a:ext>
+            </a:extLst>
+          </p:cNvPr>
+          <p:cNvPicPr>
+            <a:picLocks noChangeAspect="1"/>
+          </p:cNvPicPr>
+          <p:nvPr/>
+        </p:nvPicPr>
+        <p:blipFill rotWithShape="1">
+          <a:blip r:embed="rId4">
+            <a:extLst>
+              <a:ext uri="{96DAC541-7B7A-43D3-8B79-37D633B846F1}">
+                <asvg:svgBlip xmlns:asvg="http://schemas.microsoft.com/office/drawing/2016/SVG/main" r:embed="rId5"/>
+              </a:ext>
+            </a:extLst>
+          </a:blip>
+          <a:srcRect r="24223"/>
+          <a:stretch/>
+        </p:blipFill>
+        <p:spPr>
+          <a:xfrm>
+            <a:off x="2251956" y="4469796"/>
+            <a:ext cx="1586066" cy="2093057"/>
+          </a:xfrm>
+          <a:prstGeom prst="rect">
+            <a:avLst/>
+          </a:prstGeom>
+        </p:spPr>
+      </p:pic>
+      <p:pic>
+        <p:nvPicPr>
+          <p:cNvPr id="16" name="Graphic 15" descr="End with solid fill">
+            <a:extLst>
+              <a:ext uri="{FF2B5EF4-FFF2-40B4-BE49-F238E27FC236}">
+                <a16:creationId xmlns:a16="http://schemas.microsoft.com/office/drawing/2014/main" id="{32C23F77-7EFA-F242-8F59-775AFAF48B8F}"/>
+              </a:ext>
+            </a:extLst>
+          </p:cNvPr>
+          <p:cNvPicPr>
+            <a:picLocks noChangeAspect="1"/>
+          </p:cNvPicPr>
+          <p:nvPr/>
+        </p:nvPicPr>
+        <p:blipFill rotWithShape="1">
+          <a:blip r:embed="rId4">
+            <a:extLst>
+              <a:ext uri="{96DAC541-7B7A-43D3-8B79-37D633B846F1}">
+                <asvg:svgBlip xmlns:asvg="http://schemas.microsoft.com/office/drawing/2016/SVG/main" r:embed="rId5"/>
+              </a:ext>
+            </a:extLst>
+          </a:blip>
+          <a:srcRect r="24223"/>
+          <a:stretch/>
+        </p:blipFill>
+        <p:spPr>
+          <a:xfrm flipH="1">
+            <a:off x="679617" y="3168340"/>
+            <a:ext cx="1586065" cy="2093057"/>
+          </a:xfrm>
+          <a:prstGeom prst="rect">
+            <a:avLst/>
+          </a:prstGeom>
+        </p:spPr>
+      </p:pic>
     </p:spTree>
     <p:extLst>
       <p:ext uri="{BB962C8B-B14F-4D97-AF65-F5344CB8AC3E}">

</xml_diff>